<commit_message>
re-ran model and minor fixes
</commit_message>
<xml_diff>
--- a/Presentation.pptx
+++ b/Presentation.pptx
@@ -3470,8 +3470,8 @@
         </p:nvSpPr>
         <p:spPr>
           <a:xfrm>
-            <a:off x="804671" y="2858703"/>
-            <a:ext cx="5285791" cy="3042547"/>
+            <a:off x="434446" y="2857982"/>
+            <a:ext cx="6008046" cy="3042547"/>
           </a:xfrm>
         </p:spPr>
         <p:txBody>
@@ -3512,8 +3512,31 @@
                   <a:srgbClr val="FFFFFF"/>
                 </a:solidFill>
               </a:rPr>
-              <a:t>- Decrease emergency room wait times</a:t>
-            </a:r>
+              <a:t>- Responsible for 15% of all deaths in kids under 5 in 2017</a:t>
+            </a:r>
+          </a:p>
+          <a:p>
+            <a:pPr lvl="1"/>
+            <a:r>
+              <a:rPr lang="en-US" dirty="0">
+                <a:solidFill>
+                  <a:schemeClr val="bg1"/>
+                </a:solidFill>
+                <a:hlinkClick r:id="rId2">
+                  <a:extLst>
+                    <a:ext uri="{A12FA001-AC4F-418D-AE19-62706E023703}">
+                      <ahyp:hlinkClr xmlns:ahyp="http://schemas.microsoft.com/office/drawing/2018/hyperlinkcolor" val="tx"/>
+                    </a:ext>
+                  </a:extLst>
+                </a:hlinkClick>
+              </a:rPr>
+              <a:t>(World Health Organization)</a:t>
+            </a:r>
+            <a:endParaRPr lang="en-US" dirty="0">
+              <a:solidFill>
+                <a:schemeClr val="bg1"/>
+              </a:solidFill>
+            </a:endParaRPr>
           </a:p>
           <a:p>
             <a:r>
@@ -3522,7 +3545,17 @@
                   <a:srgbClr val="FFFFFF"/>
                 </a:solidFill>
               </a:rPr>
-              <a:t>- Refer a patient to a third-party radiology company</a:t>
+              <a:t>- Decrease emergency room wait times and get faster care</a:t>
+            </a:r>
+          </a:p>
+          <a:p>
+            <a:r>
+              <a:rPr lang="en-US" dirty="0">
+                <a:solidFill>
+                  <a:srgbClr val="FFFFFF"/>
+                </a:solidFill>
+              </a:rPr>
+              <a:t>- 5,860 total X-Ray images in dataset</a:t>
             </a:r>
           </a:p>
         </p:txBody>
@@ -3669,7 +3702,7 @@
           <p:nvPr/>
         </p:nvPicPr>
         <p:blipFill>
-          <a:blip r:embed="rId2"/>
+          <a:blip r:embed="rId3"/>
           <a:stretch>
             <a:fillRect/>
           </a:stretch>
@@ -3817,6 +3850,14 @@
 <file path=ppt/slides/slide4.xml><?xml version="1.0" encoding="utf-8"?>
 <p:sld xmlns:a="http://schemas.openxmlformats.org/drawingml/2006/main" xmlns:r="http://schemas.openxmlformats.org/officeDocument/2006/relationships" xmlns:p="http://schemas.openxmlformats.org/presentationml/2006/main">
   <p:cSld>
+    <p:bg>
+      <p:bgPr>
+        <a:solidFill>
+          <a:schemeClr val="accent2"/>
+        </a:solidFill>
+        <a:effectLst/>
+      </p:bgPr>
+    </p:bg>
     <p:spTree>
       <p:nvGrpSpPr>
         <p:cNvPr id="1" name=""/>
@@ -3831,6 +3872,136 @@
           <a:chExt cx="0" cy="0"/>
         </a:xfrm>
       </p:grpSpPr>
+      <p:sp>
+        <p:nvSpPr>
+          <p:cNvPr id="15" name="Rectangle 14">
+            <a:extLst>
+              <a:ext uri="{FF2B5EF4-FFF2-40B4-BE49-F238E27FC236}">
+                <a16:creationId xmlns:a16="http://schemas.microsoft.com/office/drawing/2014/main" id="{E9F26AF7-9AC1-49A4-8F89-2C63E1C0A0BB}"/>
+              </a:ext>
+              <a:ext uri="{C183D7F6-B498-43B3-948B-1728B52AA6E4}">
+                <adec:decorative xmlns:adec="http://schemas.microsoft.com/office/drawing/2017/decorative" val="1"/>
+              </a:ext>
+            </a:extLst>
+          </p:cNvPr>
+          <p:cNvSpPr>
+            <a:spLocks noGrp="1" noRot="1" noChangeAspect="1" noMove="1" noResize="1" noEditPoints="1" noAdjustHandles="1" noChangeArrowheads="1" noChangeShapeType="1" noTextEdit="1"/>
+          </p:cNvSpPr>
+          <p:nvPr>
+            <p:extLst>
+              <p:ext uri="{386F3935-93C4-4BCD-93E2-E3B085C9AB24}">
+                <p16:designElem xmlns:p16="http://schemas.microsoft.com/office/powerpoint/2015/main" val="1"/>
+              </p:ext>
+            </p:extLst>
+          </p:nvPr>
+        </p:nvSpPr>
+        <p:spPr>
+          <a:xfrm>
+            <a:off x="0" y="-2"/>
+            <a:ext cx="12192000" cy="4918511"/>
+          </a:xfrm>
+          <a:prstGeom prst="rect">
+            <a:avLst/>
+          </a:prstGeom>
+          <a:solidFill>
+            <a:srgbClr val="FFFFFF"/>
+          </a:solidFill>
+          <a:ln>
+            <a:noFill/>
+          </a:ln>
+        </p:spPr>
+        <p:style>
+          <a:lnRef idx="2">
+            <a:schemeClr val="accent1">
+              <a:shade val="50000"/>
+            </a:schemeClr>
+          </a:lnRef>
+          <a:fillRef idx="1">
+            <a:schemeClr val="accent1"/>
+          </a:fillRef>
+          <a:effectRef idx="0">
+            <a:schemeClr val="accent1"/>
+          </a:effectRef>
+          <a:fontRef idx="minor">
+            <a:schemeClr val="lt1"/>
+          </a:fontRef>
+        </p:style>
+        <p:txBody>
+          <a:bodyPr rtlCol="0" anchor="ctr"/>
+          <a:lstStyle/>
+          <a:p>
+            <a:pPr algn="ctr"/>
+            <a:endParaRPr lang="en-US"/>
+          </a:p>
+        </p:txBody>
+      </p:sp>
+      <p:sp>
+        <p:nvSpPr>
+          <p:cNvPr id="6" name="Title 5">
+            <a:extLst>
+              <a:ext uri="{FF2B5EF4-FFF2-40B4-BE49-F238E27FC236}">
+                <a16:creationId xmlns:a16="http://schemas.microsoft.com/office/drawing/2014/main" id="{43EA50DC-64D0-C3A6-9AE2-75F7FFC5B39A}"/>
+              </a:ext>
+            </a:extLst>
+          </p:cNvPr>
+          <p:cNvSpPr>
+            <a:spLocks noGrp="1"/>
+          </p:cNvSpPr>
+          <p:nvPr>
+            <p:ph type="title"/>
+          </p:nvPr>
+        </p:nvSpPr>
+        <p:spPr>
+          <a:xfrm>
+            <a:off x="1600200" y="4269282"/>
+            <a:ext cx="8991600" cy="1264762"/>
+          </a:xfrm>
+        </p:spPr>
+        <p:txBody>
+          <a:bodyPr vert="horz" lIns="274320" tIns="182880" rIns="274320" bIns="182880" rtlCol="0" anchor="ctr" anchorCtr="1">
+            <a:normAutofit/>
+          </a:bodyPr>
+          <a:lstStyle/>
+          <a:p>
+            <a:r>
+              <a:rPr lang="en-US" sz="3200" dirty="0"/>
+              <a:t>Pixel intensity comparison</a:t>
+            </a:r>
+          </a:p>
+        </p:txBody>
+      </p:sp>
+      <p:pic>
+        <p:nvPicPr>
+          <p:cNvPr id="10" name="Content Placeholder 9" descr="A graph of a number of data&#10;&#10;Description automatically generated with medium confidence">
+            <a:extLst>
+              <a:ext uri="{FF2B5EF4-FFF2-40B4-BE49-F238E27FC236}">
+                <a16:creationId xmlns:a16="http://schemas.microsoft.com/office/drawing/2014/main" id="{2F40B656-77D3-32AF-6655-F7EB19F9B5C8}"/>
+              </a:ext>
+            </a:extLst>
+          </p:cNvPr>
+          <p:cNvPicPr>
+            <a:picLocks noGrp="1" noChangeAspect="1"/>
+          </p:cNvPicPr>
+          <p:nvPr>
+            <p:ph sz="quarter" idx="4"/>
+          </p:nvPr>
+        </p:nvPicPr>
+        <p:blipFill>
+          <a:blip r:embed="rId2"/>
+          <a:stretch>
+            <a:fillRect/>
+          </a:stretch>
+        </p:blipFill>
+        <p:spPr>
+          <a:xfrm>
+            <a:off x="1556004" y="600021"/>
+            <a:ext cx="4297680" cy="3276981"/>
+          </a:xfrm>
+          <a:prstGeom prst="rect">
+            <a:avLst/>
+          </a:prstGeom>
+        </p:spPr>
+      </p:pic>
       <p:pic>
         <p:nvPicPr>
           <p:cNvPr id="8" name="Content Placeholder 7" descr="A graph of a normal x-ray&#10;&#10;Description automatically generated">
@@ -3848,35 +4019,6 @@
           </p:nvPr>
         </p:nvPicPr>
         <p:blipFill>
-          <a:blip r:embed="rId2"/>
-          <a:stretch>
-            <a:fillRect/>
-          </a:stretch>
-        </p:blipFill>
-        <p:spPr>
-          <a:xfrm>
-            <a:off x="466059" y="2313433"/>
-            <a:ext cx="5387625" cy="4104857"/>
-          </a:xfrm>
-        </p:spPr>
-      </p:pic>
-      <p:pic>
-        <p:nvPicPr>
-          <p:cNvPr id="10" name="Content Placeholder 9" descr="A graph of a number of data&#10;&#10;Description automatically generated with medium confidence">
-            <a:extLst>
-              <a:ext uri="{FF2B5EF4-FFF2-40B4-BE49-F238E27FC236}">
-                <a16:creationId xmlns:a16="http://schemas.microsoft.com/office/drawing/2014/main" id="{2F40B656-77D3-32AF-6655-F7EB19F9B5C8}"/>
-              </a:ext>
-            </a:extLst>
-          </p:cNvPr>
-          <p:cNvPicPr>
-            <a:picLocks noGrp="1" noChangeAspect="1"/>
-          </p:cNvPicPr>
-          <p:nvPr>
-            <p:ph sz="quarter" idx="4"/>
-          </p:nvPr>
-        </p:nvPicPr>
-        <p:blipFill>
           <a:blip r:embed="rId3"/>
           <a:stretch>
             <a:fillRect/>
@@ -3884,39 +4026,14 @@
         </p:blipFill>
         <p:spPr>
           <a:xfrm>
-            <a:off x="6338315" y="2313432"/>
-            <a:ext cx="5387624" cy="4104857"/>
+            <a:off x="6338316" y="600021"/>
+            <a:ext cx="4297680" cy="3276981"/>
           </a:xfrm>
+          <a:prstGeom prst="rect">
+            <a:avLst/>
+          </a:prstGeom>
         </p:spPr>
       </p:pic>
-      <p:sp>
-        <p:nvSpPr>
-          <p:cNvPr id="6" name="Title 5">
-            <a:extLst>
-              <a:ext uri="{FF2B5EF4-FFF2-40B4-BE49-F238E27FC236}">
-                <a16:creationId xmlns:a16="http://schemas.microsoft.com/office/drawing/2014/main" id="{43EA50DC-64D0-C3A6-9AE2-75F7FFC5B39A}"/>
-              </a:ext>
-            </a:extLst>
-          </p:cNvPr>
-          <p:cNvSpPr>
-            <a:spLocks noGrp="1"/>
-          </p:cNvSpPr>
-          <p:nvPr>
-            <p:ph type="title"/>
-          </p:nvPr>
-        </p:nvSpPr>
-        <p:spPr/>
-        <p:txBody>
-          <a:bodyPr/>
-          <a:lstStyle/>
-          <a:p>
-            <a:r>
-              <a:rPr lang="en-US" dirty="0"/>
-              <a:t>Pixel comparison</a:t>
-            </a:r>
-          </a:p>
-        </p:txBody>
-      </p:sp>
     </p:spTree>
     <p:extLst>
       <p:ext uri="{BB962C8B-B14F-4D97-AF65-F5344CB8AC3E}">
@@ -4022,19 +4139,19 @@
           <a:p>
             <a:r>
               <a:rPr lang="en-US" dirty="0"/>
-              <a:t>- 98.3% true positive rate</a:t>
+              <a:t>- 99.2% true positive rate</a:t>
             </a:r>
           </a:p>
           <a:p>
             <a:r>
               <a:rPr lang="en-US" dirty="0"/>
-              <a:t>- 1.7% false negative rate</a:t>
+              <a:t>- .08% false negative rate</a:t>
             </a:r>
           </a:p>
           <a:p>
             <a:r>
               <a:rPr lang="en-US" dirty="0"/>
-              <a:t>- 5.6% false positive rate</a:t>
+              <a:t>- 59.5% false positive rate</a:t>
             </a:r>
           </a:p>
         </p:txBody>
@@ -4168,10 +4285,10 @@
       </p:sp>
       <p:pic>
         <p:nvPicPr>
-          <p:cNvPr id="5" name="Content Placeholder 4" descr="A chart of a disease&#10;&#10;Description automatically generated with medium confidence">
+          <p:cNvPr id="7" name="Picture 6" descr="A chart with a red and purple squares&#10;&#10;Description automatically generated with medium confidence">
             <a:extLst>
               <a:ext uri="{FF2B5EF4-FFF2-40B4-BE49-F238E27FC236}">
-                <a16:creationId xmlns:a16="http://schemas.microsoft.com/office/drawing/2014/main" id="{CC6471EC-05BC-B632-5A37-F026CDBB4E9D}"/>
+                <a16:creationId xmlns:a16="http://schemas.microsoft.com/office/drawing/2014/main" id="{DEEFA241-DA5F-7D15-EC12-F3BE5D7FFC98}"/>
               </a:ext>
             </a:extLst>
           </p:cNvPr>
@@ -4188,8 +4305,8 @@
         </p:blipFill>
         <p:spPr>
           <a:xfrm>
-            <a:off x="5539480" y="1293275"/>
-            <a:ext cx="4794836" cy="4279392"/>
+            <a:off x="5652125" y="1210679"/>
+            <a:ext cx="4949111" cy="4608576"/>
           </a:xfrm>
           <a:prstGeom prst="rect">
             <a:avLst/>

</xml_diff>